<commit_message>
Added Teradata sections as place holders
</commit_message>
<xml_diff>
--- a/Assessment/AssessmentTool.pptx
+++ b/Assessment/AssessmentTool.pptx
@@ -6,10 +6,10 @@
     <p:sldMasterId id="2147484444" r:id="rId5"/>
   </p:sldMasterIdLst>
   <p:notesMasterIdLst>
-    <p:notesMasterId r:id="rId23"/>
+    <p:notesMasterId r:id="rId24"/>
   </p:notesMasterIdLst>
   <p:handoutMasterIdLst>
-    <p:handoutMasterId r:id="rId24"/>
+    <p:handoutMasterId r:id="rId25"/>
   </p:handoutMasterIdLst>
   <p:sldIdLst>
     <p:sldId id="554" r:id="rId6"/>
@@ -26,9 +26,10 @@
     <p:sldId id="1369" r:id="rId17"/>
     <p:sldId id="1374" r:id="rId18"/>
     <p:sldId id="1377" r:id="rId19"/>
-    <p:sldId id="1376" r:id="rId20"/>
-    <p:sldId id="1375" r:id="rId21"/>
-    <p:sldId id="1370" r:id="rId22"/>
+    <p:sldId id="1379" r:id="rId20"/>
+    <p:sldId id="1376" r:id="rId21"/>
+    <p:sldId id="1375" r:id="rId22"/>
+    <p:sldId id="1370" r:id="rId23"/>
   </p:sldIdLst>
   <p:sldSz cx="12436475" cy="6994525"/>
   <p:notesSz cx="6858000" cy="9144000"/>
@@ -331,7 +332,7 @@
               <a:rPr lang="en-US" smtClean="0">
                 <a:latin typeface="Segoe UI" pitchFamily="34" charset="0"/>
               </a:rPr>
-              <a:t>12/17/2018 6:30 PM</a:t>
+              <a:t>12/19/2018 9:03 AM</a:t>
             </a:fld>
             <a:endParaRPr lang="en-US" dirty="0">
               <a:latin typeface="Segoe UI" pitchFamily="34" charset="0"/>
@@ -609,7 +610,7 @@
           <a:p>
             <a:fld id="{38EEC551-8CDA-4EB6-89BB-2A86C9F091C8}" type="datetime8">
               <a:rPr lang="en-US" smtClean="0"/>
-              <a:t>12/17/2018 4:51 PM</a:t>
+              <a:t>12/19/2018 9:02 AM</a:t>
             </a:fld>
             <a:endParaRPr lang="en-US" dirty="0"/>
           </a:p>
@@ -1075,7 +1076,7 @@
                 <a:tabLst/>
                 <a:defRPr/>
               </a:pPr>
-              <a:t>12/17/2018 4:51 PM</a:t>
+              <a:t>12/19/2018 9:02 AM</a:t>
             </a:fld>
             <a:endParaRPr kumimoji="0" lang="en-US" sz="1200" b="0" i="0" u="none" strike="noStrike" kern="1200" cap="none" spc="0" normalizeH="0" baseline="0" noProof="0">
               <a:ln>
@@ -1411,7 +1412,7 @@
                 <a:tabLst/>
                 <a:defRPr/>
               </a:pPr>
-              <a:t>12/18/2018 1:58 PM</a:t>
+              <a:t>12/19/2018 9:02 AM</a:t>
             </a:fld>
             <a:endParaRPr kumimoji="0" lang="en-US" sz="1200" b="0" i="0" u="none" strike="noStrike" kern="1200" cap="none" spc="0" normalizeH="0" baseline="0" noProof="0">
               <a:ln>
@@ -1747,7 +1748,7 @@
                 <a:tabLst/>
                 <a:defRPr/>
               </a:pPr>
-              <a:t>12/17/2018 6:36 PM</a:t>
+              <a:t>12/19/2018 9:02 AM</a:t>
             </a:fld>
             <a:endParaRPr kumimoji="0" lang="en-US" sz="1200" b="0" i="0" u="none" strike="noStrike" kern="1200" cap="none" spc="0" normalizeH="0" baseline="0" noProof="0">
               <a:ln>
@@ -2083,7 +2084,7 @@
                 <a:tabLst/>
                 <a:defRPr/>
               </a:pPr>
-              <a:t>12/17/2018 6:38 PM</a:t>
+              <a:t>12/19/2018 9:02 AM</a:t>
             </a:fld>
             <a:endParaRPr kumimoji="0" lang="en-US" sz="1200" b="0" i="0" u="none" strike="noStrike" kern="1200" cap="none" spc="0" normalizeH="0" baseline="0" noProof="0">
               <a:ln>
@@ -2419,7 +2420,7 @@
                 <a:tabLst/>
                 <a:defRPr/>
               </a:pPr>
-              <a:t>12/17/2018 6:48 PM</a:t>
+              <a:t>12/19/2018 9:02 AM</a:t>
             </a:fld>
             <a:endParaRPr kumimoji="0" lang="en-US" sz="1200" b="0" i="0" u="none" strike="noStrike" kern="1200" cap="none" spc="0" normalizeH="0" baseline="0" noProof="0">
               <a:ln>
@@ -2755,7 +2756,7 @@
                 <a:tabLst/>
                 <a:defRPr/>
               </a:pPr>
-              <a:t>12/17/2018 7:32 PM</a:t>
+              <a:t>12/19/2018 9:02 AM</a:t>
             </a:fld>
             <a:endParaRPr kumimoji="0" lang="en-US" sz="1200" b="0" i="0" u="none" strike="noStrike" kern="1200" cap="none" spc="0" normalizeH="0" baseline="0" noProof="0">
               <a:ln>
@@ -3091,7 +3092,7 @@
                 <a:tabLst/>
                 <a:defRPr/>
               </a:pPr>
-              <a:t>12/17/2018 7:31 PM</a:t>
+              <a:t>12/19/2018 9:04 AM</a:t>
             </a:fld>
             <a:endParaRPr kumimoji="0" lang="en-US" sz="1200" b="0" i="0" u="none" strike="noStrike" kern="1200" cap="none" spc="0" normalizeH="0" baseline="0" noProof="0">
               <a:ln>
@@ -3196,7 +3197,7 @@
     </p:spTree>
     <p:extLst>
       <p:ext uri="{BB962C8B-B14F-4D97-AF65-F5344CB8AC3E}">
-        <p14:creationId xmlns:p14="http://schemas.microsoft.com/office/powerpoint/2010/main" val="1227047031"/>
+        <p14:creationId xmlns:p14="http://schemas.microsoft.com/office/powerpoint/2010/main" val="548949371"/>
       </p:ext>
     </p:extLst>
   </p:cSld>
@@ -3427,7 +3428,7 @@
                 <a:tabLst/>
                 <a:defRPr/>
               </a:pPr>
-              <a:t>12/17/2018 7:36 PM</a:t>
+              <a:t>12/19/2018 9:02 AM</a:t>
             </a:fld>
             <a:endParaRPr kumimoji="0" lang="en-US" sz="1200" b="0" i="0" u="none" strike="noStrike" kern="1200" cap="none" spc="0" normalizeH="0" baseline="0" noProof="0">
               <a:ln>
@@ -3532,7 +3533,7 @@
     </p:spTree>
     <p:extLst>
       <p:ext uri="{BB962C8B-B14F-4D97-AF65-F5344CB8AC3E}">
-        <p14:creationId xmlns:p14="http://schemas.microsoft.com/office/powerpoint/2010/main" val="4128777069"/>
+        <p14:creationId xmlns:p14="http://schemas.microsoft.com/office/powerpoint/2010/main" val="1227047031"/>
       </p:ext>
     </p:extLst>
   </p:cSld>
@@ -3763,7 +3764,7 @@
                 <a:tabLst/>
                 <a:defRPr/>
               </a:pPr>
-              <a:t>12/18/2018 1:58 PM</a:t>
+              <a:t>12/19/2018 9:02 AM</a:t>
             </a:fld>
             <a:endParaRPr kumimoji="0" lang="en-US" sz="1200" b="0" i="0" u="none" strike="noStrike" kern="1200" cap="none" spc="0" normalizeH="0" baseline="0" noProof="0">
               <a:ln>
@@ -3868,6 +3869,342 @@
     </p:spTree>
     <p:extLst>
       <p:ext uri="{BB962C8B-B14F-4D97-AF65-F5344CB8AC3E}">
+        <p14:creationId xmlns:p14="http://schemas.microsoft.com/office/powerpoint/2010/main" val="4128777069"/>
+      </p:ext>
+    </p:extLst>
+  </p:cSld>
+  <p:clrMapOvr>
+    <a:masterClrMapping/>
+  </p:clrMapOvr>
+</p:notes>
+</file>
+
+<file path=ppt/notesSlides/notesSlide18.xml><?xml version="1.0" encoding="utf-8"?>
+<p:notes xmlns:a="http://schemas.openxmlformats.org/drawingml/2006/main" xmlns:r="http://schemas.openxmlformats.org/officeDocument/2006/relationships" xmlns:p="http://schemas.openxmlformats.org/presentationml/2006/main">
+  <p:cSld>
+    <p:spTree>
+      <p:nvGrpSpPr>
+        <p:cNvPr id="1" name=""/>
+        <p:cNvGrpSpPr/>
+        <p:nvPr/>
+      </p:nvGrpSpPr>
+      <p:grpSpPr>
+        <a:xfrm>
+          <a:off x="0" y="0"/>
+          <a:ext cx="0" cy="0"/>
+          <a:chOff x="0" y="0"/>
+          <a:chExt cx="0" cy="0"/>
+        </a:xfrm>
+      </p:grpSpPr>
+      <p:sp>
+        <p:nvSpPr>
+          <p:cNvPr id="2" name="Slide Image Placeholder 1"/>
+          <p:cNvSpPr>
+            <a:spLocks noGrp="1" noRot="1" noChangeAspect="1"/>
+          </p:cNvSpPr>
+          <p:nvPr>
+            <p:ph type="sldImg"/>
+          </p:nvPr>
+        </p:nvSpPr>
+        <p:spPr/>
+      </p:sp>
+      <p:sp>
+        <p:nvSpPr>
+          <p:cNvPr id="3" name="Notes Placeholder 2"/>
+          <p:cNvSpPr>
+            <a:spLocks noGrp="1"/>
+          </p:cNvSpPr>
+          <p:nvPr>
+            <p:ph type="body" idx="1"/>
+          </p:nvPr>
+        </p:nvSpPr>
+        <p:spPr/>
+        <p:txBody>
+          <a:bodyPr/>
+          <a:lstStyle/>
+          <a:p>
+            <a:endParaRPr lang="en-US"/>
+          </a:p>
+        </p:txBody>
+      </p:sp>
+      <p:sp>
+        <p:nvSpPr>
+          <p:cNvPr id="4" name="Header Placeholder 3"/>
+          <p:cNvSpPr>
+            <a:spLocks noGrp="1"/>
+          </p:cNvSpPr>
+          <p:nvPr>
+            <p:ph type="hdr" sz="quarter" idx="10"/>
+          </p:nvPr>
+        </p:nvSpPr>
+        <p:spPr/>
+        <p:txBody>
+          <a:bodyPr/>
+          <a:lstStyle/>
+          <a:p>
+            <a:pPr marL="0" marR="0" lvl="0" indent="0" algn="l" defTabSz="932742" rtl="0" eaLnBrk="1" fontAlgn="auto" latinLnBrk="0" hangingPunct="1">
+              <a:lnSpc>
+                <a:spcPct val="100000"/>
+              </a:lnSpc>
+              <a:spcBef>
+                <a:spcPts val="0"/>
+              </a:spcBef>
+              <a:spcAft>
+                <a:spcPts val="0"/>
+              </a:spcAft>
+              <a:buClrTx/>
+              <a:buSzTx/>
+              <a:buFontTx/>
+              <a:buNone/>
+              <a:tabLst/>
+              <a:defRPr/>
+            </a:pPr>
+            <a:endParaRPr kumimoji="0" lang="en-US" sz="1200" b="0" i="0" u="none" strike="noStrike" kern="1200" cap="none" spc="0" normalizeH="0" baseline="0" noProof="0">
+              <a:ln>
+                <a:noFill/>
+              </a:ln>
+              <a:solidFill>
+                <a:prstClr val="black"/>
+              </a:solidFill>
+              <a:effectLst/>
+              <a:uLnTx/>
+              <a:uFillTx/>
+              <a:latin typeface="Segoe UI" pitchFamily="34" charset="0"/>
+              <a:ea typeface="+mn-ea"/>
+              <a:cs typeface="+mn-cs"/>
+            </a:endParaRPr>
+          </a:p>
+        </p:txBody>
+      </p:sp>
+      <p:sp>
+        <p:nvSpPr>
+          <p:cNvPr id="5" name="Footer Placeholder 4"/>
+          <p:cNvSpPr>
+            <a:spLocks noGrp="1"/>
+          </p:cNvSpPr>
+          <p:nvPr>
+            <p:ph type="ftr" sz="quarter" idx="11"/>
+          </p:nvPr>
+        </p:nvSpPr>
+        <p:spPr/>
+        <p:txBody>
+          <a:bodyPr/>
+          <a:lstStyle/>
+          <a:p>
+            <a:pPr marL="571500" marR="0" lvl="0" indent="0" algn="l" defTabSz="914099" rtl="0" eaLnBrk="0" fontAlgn="auto" latinLnBrk="0" hangingPunct="0">
+              <a:lnSpc>
+                <a:spcPct val="100000"/>
+              </a:lnSpc>
+              <a:spcBef>
+                <a:spcPts val="0"/>
+              </a:spcBef>
+              <a:spcAft>
+                <a:spcPts val="0"/>
+              </a:spcAft>
+              <a:buClrTx/>
+              <a:buSzTx/>
+              <a:buFontTx/>
+              <a:buNone/>
+              <a:tabLst/>
+              <a:defRPr/>
+            </a:pPr>
+            <a:r>
+              <a:rPr kumimoji="0" lang="en-US" sz="400" b="0" i="0" u="none" strike="noStrike" kern="1200" cap="none" spc="0" normalizeH="0" baseline="0" noProof="0">
+                <a:ln>
+                  <a:noFill/>
+                </a:ln>
+                <a:gradFill>
+                  <a:gsLst>
+                    <a:gs pos="0">
+                      <a:prstClr val="black"/>
+                    </a:gs>
+                    <a:gs pos="100000">
+                      <a:prstClr val="black"/>
+                    </a:gs>
+                  </a:gsLst>
+                  <a:lin ang="5400000" scaled="0"/>
+                </a:gradFill>
+                <a:effectLst/>
+                <a:uLnTx/>
+                <a:uFillTx/>
+                <a:latin typeface="Segoe UI" pitchFamily="34" charset="0"/>
+                <a:ea typeface="Segoe UI" pitchFamily="34" charset="0"/>
+                <a:cs typeface="Segoe UI" pitchFamily="34" charset="0"/>
+              </a:rPr>
+              <a:t>© 2014 Microsoft Corporation. All rights reserved. MICROSOFT MAKES NO WARRANTIES, EXPRESS, IMPLIED OR STATUTORY, AS TO THE INFORMATION IN THIS PRESENTATION.</a:t>
+            </a:r>
+          </a:p>
+        </p:txBody>
+      </p:sp>
+      <p:sp>
+        <p:nvSpPr>
+          <p:cNvPr id="6" name="Date Placeholder 5"/>
+          <p:cNvSpPr>
+            <a:spLocks noGrp="1"/>
+          </p:cNvSpPr>
+          <p:nvPr>
+            <p:ph type="dt" idx="12"/>
+          </p:nvPr>
+        </p:nvSpPr>
+        <p:spPr/>
+        <p:txBody>
+          <a:bodyPr/>
+          <a:lstStyle/>
+          <a:p>
+            <a:pPr marL="0" marR="0" lvl="0" indent="0" algn="r" defTabSz="932742" rtl="0" eaLnBrk="1" fontAlgn="auto" latinLnBrk="0" hangingPunct="1">
+              <a:lnSpc>
+                <a:spcPct val="100000"/>
+              </a:lnSpc>
+              <a:spcBef>
+                <a:spcPts val="0"/>
+              </a:spcBef>
+              <a:spcAft>
+                <a:spcPts val="0"/>
+              </a:spcAft>
+              <a:buClrTx/>
+              <a:buSzTx/>
+              <a:buFontTx/>
+              <a:buNone/>
+              <a:tabLst/>
+              <a:defRPr/>
+            </a:pPr>
+            <a:fld id="{38EEC551-8CDA-4EB6-89BB-2A86C9F091C8}" type="datetime8">
+              <a:rPr kumimoji="0" lang="en-US" sz="1200" b="0" i="0" u="none" strike="noStrike" kern="1200" cap="none" spc="0" normalizeH="0" baseline="0" noProof="0" smtClean="0">
+                <a:ln>
+                  <a:noFill/>
+                </a:ln>
+                <a:solidFill>
+                  <a:prstClr val="black"/>
+                </a:solidFill>
+                <a:effectLst/>
+                <a:uLnTx/>
+                <a:uFillTx/>
+                <a:latin typeface="Segoe UI" pitchFamily="34" charset="0"/>
+                <a:ea typeface="+mn-ea"/>
+                <a:cs typeface="+mn-cs"/>
+              </a:rPr>
+              <a:pPr marL="0" marR="0" lvl="0" indent="0" algn="r" defTabSz="932742" rtl="0" eaLnBrk="1" fontAlgn="auto" latinLnBrk="0" hangingPunct="1">
+                <a:lnSpc>
+                  <a:spcPct val="100000"/>
+                </a:lnSpc>
+                <a:spcBef>
+                  <a:spcPts val="0"/>
+                </a:spcBef>
+                <a:spcAft>
+                  <a:spcPts val="0"/>
+                </a:spcAft>
+                <a:buClrTx/>
+                <a:buSzTx/>
+                <a:buFontTx/>
+                <a:buNone/>
+                <a:tabLst/>
+                <a:defRPr/>
+              </a:pPr>
+              <a:t>12/19/2018 9:02 AM</a:t>
+            </a:fld>
+            <a:endParaRPr kumimoji="0" lang="en-US" sz="1200" b="0" i="0" u="none" strike="noStrike" kern="1200" cap="none" spc="0" normalizeH="0" baseline="0" noProof="0">
+              <a:ln>
+                <a:noFill/>
+              </a:ln>
+              <a:solidFill>
+                <a:prstClr val="black"/>
+              </a:solidFill>
+              <a:effectLst/>
+              <a:uLnTx/>
+              <a:uFillTx/>
+              <a:latin typeface="Segoe UI" pitchFamily="34" charset="0"/>
+              <a:ea typeface="+mn-ea"/>
+              <a:cs typeface="+mn-cs"/>
+            </a:endParaRPr>
+          </a:p>
+        </p:txBody>
+      </p:sp>
+      <p:sp>
+        <p:nvSpPr>
+          <p:cNvPr id="7" name="Slide Number Placeholder 6"/>
+          <p:cNvSpPr>
+            <a:spLocks noGrp="1"/>
+          </p:cNvSpPr>
+          <p:nvPr>
+            <p:ph type="sldNum" sz="quarter" idx="13"/>
+          </p:nvPr>
+        </p:nvSpPr>
+        <p:spPr/>
+        <p:txBody>
+          <a:bodyPr/>
+          <a:lstStyle/>
+          <a:p>
+            <a:pPr marL="0" marR="0" lvl="0" indent="0" algn="r" defTabSz="932742" rtl="0" eaLnBrk="1" fontAlgn="auto" latinLnBrk="0" hangingPunct="1">
+              <a:lnSpc>
+                <a:spcPct val="100000"/>
+              </a:lnSpc>
+              <a:spcBef>
+                <a:spcPts val="0"/>
+              </a:spcBef>
+              <a:spcAft>
+                <a:spcPts val="0"/>
+              </a:spcAft>
+              <a:buClrTx/>
+              <a:buSzTx/>
+              <a:buFontTx/>
+              <a:buNone/>
+              <a:tabLst/>
+              <a:defRPr/>
+            </a:pPr>
+            <a:fld id="{B4008EB6-D09E-4580-8CD6-DDB14511944F}" type="slidenum">
+              <a:rPr kumimoji="0" lang="en-US" sz="1200" b="0" i="0" u="none" strike="noStrike" kern="1200" cap="none" spc="0" normalizeH="0" baseline="0" noProof="0" smtClean="0">
+                <a:ln>
+                  <a:noFill/>
+                </a:ln>
+                <a:solidFill>
+                  <a:prstClr val="black"/>
+                </a:solidFill>
+                <a:effectLst/>
+                <a:uLnTx/>
+                <a:uFillTx/>
+                <a:latin typeface="Segoe UI" pitchFamily="34" charset="0"/>
+                <a:ea typeface="+mn-ea"/>
+                <a:cs typeface="+mn-cs"/>
+              </a:rPr>
+              <a:pPr marL="0" marR="0" lvl="0" indent="0" algn="r" defTabSz="932742" rtl="0" eaLnBrk="1" fontAlgn="auto" latinLnBrk="0" hangingPunct="1">
+                <a:lnSpc>
+                  <a:spcPct val="100000"/>
+                </a:lnSpc>
+                <a:spcBef>
+                  <a:spcPts val="0"/>
+                </a:spcBef>
+                <a:spcAft>
+                  <a:spcPts val="0"/>
+                </a:spcAft>
+                <a:buClrTx/>
+                <a:buSzTx/>
+                <a:buFontTx/>
+                <a:buNone/>
+                <a:tabLst/>
+                <a:defRPr/>
+              </a:pPr>
+              <a:t>18</a:t>
+            </a:fld>
+            <a:endParaRPr kumimoji="0" lang="en-US" sz="1200" b="0" i="0" u="none" strike="noStrike" kern="1200" cap="none" spc="0" normalizeH="0" baseline="0" noProof="0">
+              <a:ln>
+                <a:noFill/>
+              </a:ln>
+              <a:solidFill>
+                <a:prstClr val="black"/>
+              </a:solidFill>
+              <a:effectLst/>
+              <a:uLnTx/>
+              <a:uFillTx/>
+              <a:latin typeface="Segoe UI" pitchFamily="34" charset="0"/>
+              <a:ea typeface="+mn-ea"/>
+              <a:cs typeface="+mn-cs"/>
+            </a:endParaRPr>
+          </a:p>
+        </p:txBody>
+      </p:sp>
+    </p:spTree>
+    <p:extLst>
+      <p:ext uri="{BB962C8B-B14F-4D97-AF65-F5344CB8AC3E}">
         <p14:creationId xmlns:p14="http://schemas.microsoft.com/office/powerpoint/2010/main" val="1474761450"/>
       </p:ext>
     </p:extLst>
@@ -4099,7 +4436,7 @@
                 <a:tabLst/>
                 <a:defRPr/>
               </a:pPr>
-              <a:t>12/17/2018 4:51 PM</a:t>
+              <a:t>12/19/2018 9:03 AM</a:t>
             </a:fld>
             <a:endParaRPr kumimoji="0" lang="en-US" sz="1200" b="0" i="0" u="none" strike="noStrike" kern="1200" cap="none" spc="0" normalizeH="0" baseline="0" noProof="0">
               <a:ln>
@@ -4435,7 +4772,7 @@
                 <a:tabLst/>
                 <a:defRPr/>
               </a:pPr>
-              <a:t>12/17/2018 4:51 PM</a:t>
+              <a:t>12/19/2018 9:02 AM</a:t>
             </a:fld>
             <a:endParaRPr kumimoji="0" lang="en-US" sz="1200" b="0" i="0" u="none" strike="noStrike" kern="1200" cap="none" spc="0" normalizeH="0" baseline="0" noProof="0">
               <a:ln>
@@ -4771,7 +5108,7 @@
                 <a:tabLst/>
                 <a:defRPr/>
               </a:pPr>
-              <a:t>12/17/2018 4:51 PM</a:t>
+              <a:t>12/19/2018 9:02 AM</a:t>
             </a:fld>
             <a:endParaRPr kumimoji="0" lang="en-US" sz="1200" b="0" i="0" u="none" strike="noStrike" kern="1200" cap="none" spc="0" normalizeH="0" baseline="0" noProof="0">
               <a:ln>
@@ -5107,7 +5444,7 @@
                 <a:tabLst/>
                 <a:defRPr/>
               </a:pPr>
-              <a:t>12/18/2018 7:55 PM</a:t>
+              <a:t>12/19/2018 9:02 AM</a:t>
             </a:fld>
             <a:endParaRPr kumimoji="0" lang="en-US" sz="1200" b="0" i="0" u="none" strike="noStrike" kern="1200" cap="none" spc="0" normalizeH="0" baseline="0" noProof="0">
               <a:ln>
@@ -5443,7 +5780,7 @@
                 <a:tabLst/>
                 <a:defRPr/>
               </a:pPr>
-              <a:t>12/17/2018 4:51 PM</a:t>
+              <a:t>12/19/2018 9:02 AM</a:t>
             </a:fld>
             <a:endParaRPr kumimoji="0" lang="en-US" sz="1200" b="0" i="0" u="none" strike="noStrike" kern="1200" cap="none" spc="0" normalizeH="0" baseline="0" noProof="0">
               <a:ln>
@@ -5779,7 +6116,7 @@
                 <a:tabLst/>
                 <a:defRPr/>
               </a:pPr>
-              <a:t>12/17/2018 4:51 PM</a:t>
+              <a:t>12/19/2018 9:03 AM</a:t>
             </a:fld>
             <a:endParaRPr kumimoji="0" lang="en-US" sz="1200" b="0" i="0" u="none" strike="noStrike" kern="1200" cap="none" spc="0" normalizeH="0" baseline="0" noProof="0">
               <a:ln>
@@ -6115,7 +6452,7 @@
                 <a:tabLst/>
                 <a:defRPr/>
               </a:pPr>
-              <a:t>12/18/2018 7:11 PM</a:t>
+              <a:t>12/19/2018 9:02 AM</a:t>
             </a:fld>
             <a:endParaRPr kumimoji="0" lang="en-US" sz="1200" b="0" i="0" u="none" strike="noStrike" kern="1200" cap="none" spc="0" normalizeH="0" baseline="0" noProof="0">
               <a:ln>
@@ -6451,7 +6788,7 @@
                 <a:tabLst/>
                 <a:defRPr/>
               </a:pPr>
-              <a:t>12/18/2018 7:00 PM</a:t>
+              <a:t>12/19/2018 9:02 AM</a:t>
             </a:fld>
             <a:endParaRPr kumimoji="0" lang="en-US" sz="1200" b="0" i="0" u="none" strike="noStrike" kern="1200" cap="none" spc="0" normalizeH="0" baseline="0" noProof="0">
               <a:ln>
@@ -31819,39 +32156,7 @@
                   <a:lin ang="5400000" scaled="0"/>
                 </a:gradFill>
               </a:rPr>
-              <a:t> need to change if connecting to APS or </a:t>
-            </a:r>
-            <a:r>
-              <a:rPr lang="en-US" dirty="0" err="1">
-                <a:gradFill>
-                  <a:gsLst>
-                    <a:gs pos="2917">
-                      <a:schemeClr val="tx1"/>
-                    </a:gs>
-                    <a:gs pos="30000">
-                      <a:schemeClr val="tx1"/>
-                    </a:gs>
-                  </a:gsLst>
-                  <a:lin ang="5400000" scaled="0"/>
-                </a:gradFill>
-              </a:rPr>
-              <a:t>AzureDW</a:t>
-            </a:r>
-            <a:r>
-              <a:rPr lang="en-US" dirty="0">
-                <a:gradFill>
-                  <a:gsLst>
-                    <a:gs pos="2917">
-                      <a:schemeClr val="tx1"/>
-                    </a:gs>
-                    <a:gs pos="30000">
-                      <a:schemeClr val="tx1"/>
-                    </a:gs>
-                  </a:gsLst>
-                  <a:lin ang="5400000" scaled="0"/>
-                </a:gradFill>
-              </a:rPr>
-              <a:t>.</a:t>
+              <a:t> need to changed.</a:t>
             </a:r>
           </a:p>
           <a:p>
@@ -32144,8 +32449,8 @@
         </p:nvSpPr>
         <p:spPr>
           <a:xfrm>
-            <a:off x="2439768" y="2984291"/>
-            <a:ext cx="7556938" cy="2862322"/>
+            <a:off x="2576404" y="4759622"/>
+            <a:ext cx="7556938" cy="1384995"/>
           </a:xfrm>
           <a:prstGeom prst="rect">
             <a:avLst/>
@@ -32162,6 +32467,12 @@
           </a:bodyPr>
           <a:lstStyle/>
           <a:p>
+            <a:r>
+              <a:rPr lang="en-US" sz="1200" dirty="0"/>
+              <a:t>"Netezza":</a:t>
+            </a:r>
+          </a:p>
+          <a:p>
             <a:pPr>
               <a:tabLst>
                 <a:tab pos="461963" algn="l"/>
@@ -32170,15 +32481,7 @@
             </a:pPr>
             <a:r>
               <a:rPr lang="en-US" sz="1200" dirty="0"/>
-              <a:t>"</a:t>
-            </a:r>
-            <a:r>
-              <a:rPr lang="en-US" sz="1200" dirty="0" err="1"/>
-              <a:t>VersionQuery</a:t>
-            </a:r>
-            <a:r>
-              <a:rPr lang="en-US" sz="1200" dirty="0"/>
-              <a:t>":</a:t>
+              <a:t>[</a:t>
             </a:r>
           </a:p>
           <a:p>
@@ -32190,7 +32493,7 @@
             </a:pPr>
             <a:r>
               <a:rPr lang="en-US" sz="1200" dirty="0"/>
-              <a:t>[</a:t>
+              <a:t>	{</a:t>
             </a:r>
           </a:p>
           <a:p>
@@ -32202,7 +32505,15 @@
             </a:pPr>
             <a:r>
               <a:rPr lang="en-US" sz="1200" dirty="0"/>
-              <a:t>	{</a:t>
+              <a:t>		"</a:t>
+            </a:r>
+            <a:r>
+              <a:rPr lang="en-US" sz="1200" dirty="0" err="1"/>
+              <a:t>Database":"SYSTEM</a:t>
+            </a:r>
+            <a:r>
+              <a:rPr lang="en-US" sz="1200" dirty="0"/>
+              <a:t>",</a:t>
             </a:r>
           </a:p>
           <a:p>
@@ -32214,179 +32525,7 @@
             </a:pPr>
             <a:r>
               <a:rPr lang="en-US" sz="1200" dirty="0"/>
-              <a:t>		"</a:t>
-            </a:r>
-            <a:r>
-              <a:rPr lang="en-US" sz="1200" dirty="0" err="1"/>
-              <a:t>System":"Netezza</a:t>
-            </a:r>
-            <a:r>
-              <a:rPr lang="en-US" sz="1200" dirty="0"/>
-              <a:t>",</a:t>
-            </a:r>
-          </a:p>
-          <a:p>
-            <a:pPr>
-              <a:tabLst>
-                <a:tab pos="461963" algn="l"/>
-                <a:tab pos="914400" algn="l"/>
-              </a:tabLst>
-            </a:pPr>
-            <a:r>
-              <a:rPr lang="en-US" sz="1200" dirty="0"/>
-              <a:t>		"</a:t>
-            </a:r>
-            <a:r>
-              <a:rPr lang="en-US" sz="1200" dirty="0" err="1"/>
-              <a:t>Query":"select</a:t>
-            </a:r>
-            <a:r>
-              <a:rPr lang="en-US" sz="1200" dirty="0"/>
-              <a:t> </a:t>
-            </a:r>
-            <a:r>
-              <a:rPr lang="en-US" sz="1200" dirty="0" err="1"/>
-              <a:t>system_software_version</a:t>
-            </a:r>
-            <a:r>
-              <a:rPr lang="en-US" sz="1200" dirty="0"/>
-              <a:t> Version from _</a:t>
-            </a:r>
-            <a:r>
-              <a:rPr lang="en-US" sz="1200" dirty="0" err="1"/>
-              <a:t>v_system_info</a:t>
-            </a:r>
-            <a:r>
-              <a:rPr lang="en-US" sz="1200" dirty="0"/>
-              <a:t>"</a:t>
-            </a:r>
-          </a:p>
-          <a:p>
-            <a:pPr>
-              <a:tabLst>
-                <a:tab pos="461963" algn="l"/>
-                <a:tab pos="914400" algn="l"/>
-              </a:tabLst>
-            </a:pPr>
-            <a:r>
-              <a:rPr lang="en-US" sz="1200" dirty="0"/>
-              <a:t>	},</a:t>
-            </a:r>
-          </a:p>
-          <a:p>
-            <a:pPr>
-              <a:tabLst>
-                <a:tab pos="461963" algn="l"/>
-                <a:tab pos="914400" algn="l"/>
-              </a:tabLst>
-            </a:pPr>
-            <a:r>
-              <a:rPr lang="en-US" sz="1200" dirty="0"/>
-              <a:t>	{</a:t>
-            </a:r>
-          </a:p>
-          <a:p>
-            <a:pPr>
-              <a:tabLst>
-                <a:tab pos="461963" algn="l"/>
-                <a:tab pos="914400" algn="l"/>
-              </a:tabLst>
-            </a:pPr>
-            <a:r>
-              <a:rPr lang="en-US" sz="1200" dirty="0"/>
-              <a:t>		"</a:t>
-            </a:r>
-            <a:r>
-              <a:rPr lang="en-US" sz="1200" dirty="0" err="1"/>
-              <a:t>System":"APS</a:t>
-            </a:r>
-            <a:r>
-              <a:rPr lang="en-US" sz="1200" dirty="0"/>
-              <a:t>",</a:t>
-            </a:r>
-          </a:p>
-          <a:p>
-            <a:pPr>
-              <a:tabLst>
-                <a:tab pos="461963" algn="l"/>
-                <a:tab pos="914400" algn="l"/>
-              </a:tabLst>
-            </a:pPr>
-            <a:r>
-              <a:rPr lang="en-US" sz="1200" dirty="0"/>
-              <a:t>		"</a:t>
-            </a:r>
-            <a:r>
-              <a:rPr lang="en-US" sz="1200" dirty="0" err="1"/>
-              <a:t>Query":"select</a:t>
-            </a:r>
-            <a:r>
-              <a:rPr lang="en-US" sz="1200" dirty="0"/>
-              <a:t> @@version as Version"</a:t>
-            </a:r>
-          </a:p>
-          <a:p>
-            <a:pPr>
-              <a:tabLst>
-                <a:tab pos="461963" algn="l"/>
-                <a:tab pos="914400" algn="l"/>
-              </a:tabLst>
-            </a:pPr>
-            <a:r>
-              <a:rPr lang="en-US" sz="1200" dirty="0"/>
-              <a:t>	},</a:t>
-            </a:r>
-          </a:p>
-          <a:p>
-            <a:pPr>
-              <a:tabLst>
-                <a:tab pos="461963" algn="l"/>
-                <a:tab pos="914400" algn="l"/>
-              </a:tabLst>
-            </a:pPr>
-            <a:r>
-              <a:rPr lang="en-US" sz="1200" dirty="0"/>
-              <a:t>	{</a:t>
-            </a:r>
-          </a:p>
-          <a:p>
-            <a:pPr>
-              <a:tabLst>
-                <a:tab pos="461963" algn="l"/>
-                <a:tab pos="914400" algn="l"/>
-              </a:tabLst>
-            </a:pPr>
-            <a:r>
-              <a:rPr lang="en-US" sz="1200" dirty="0"/>
-              <a:t>		"</a:t>
-            </a:r>
-            <a:r>
-              <a:rPr lang="en-US" sz="1200" dirty="0" err="1"/>
-              <a:t>System":"AZUREDW</a:t>
-            </a:r>
-            <a:r>
-              <a:rPr lang="en-US" sz="1200" dirty="0"/>
-              <a:t>",</a:t>
-            </a:r>
-          </a:p>
-          <a:p>
-            <a:pPr>
-              <a:tabLst>
-                <a:tab pos="461963" algn="l"/>
-                <a:tab pos="914400" algn="l"/>
-              </a:tabLst>
-            </a:pPr>
-            <a:r>
-              <a:rPr lang="en-US" sz="1200" dirty="0"/>
-              <a:t>		"</a:t>
-            </a:r>
-            <a:r>
-              <a:rPr lang="en-US" sz="1200" dirty="0" err="1"/>
-              <a:t>Query":"select</a:t>
-            </a:r>
-            <a:r>
-              <a:rPr lang="en-US" sz="1200" dirty="0"/>
-              <a:t> @@version as Version"</a:t>
+              <a:t>		"Port":"5480",</a:t>
             </a:r>
           </a:p>
           <a:p>
@@ -32430,7 +32569,7 @@
         <p:spPr>
           <a:xfrm>
             <a:off x="157655" y="1147912"/>
-            <a:ext cx="11896340" cy="1883593"/>
+            <a:ext cx="11896340" cy="2480679"/>
           </a:xfrm>
           <a:prstGeom prst="rect">
             <a:avLst/>
@@ -32465,7 +32604,7 @@
                   <a:lin ang="5400000" scaled="0"/>
                 </a:gradFill>
               </a:rPr>
-              <a:t>Version Query Configuration: </a:t>
+              <a:t>Teradata Configuration: </a:t>
             </a:r>
           </a:p>
           <a:p>
@@ -32523,7 +32662,39 @@
                   <a:lin ang="5400000" scaled="0"/>
                 </a:gradFill>
               </a:rPr>
-              <a:t>query needed to return the version of the source system for each support system.</a:t>
+              <a:t>values in the Teradata Configuration section that </a:t>
+            </a:r>
+            <a:r>
+              <a:rPr lang="en-US" b="1" dirty="0">
+                <a:gradFill>
+                  <a:gsLst>
+                    <a:gs pos="2917">
+                      <a:schemeClr val="tx1"/>
+                    </a:gs>
+                    <a:gs pos="30000">
+                      <a:schemeClr val="tx1"/>
+                    </a:gs>
+                  </a:gsLst>
+                  <a:lin ang="5400000" scaled="0"/>
+                </a:gradFill>
+              </a:rPr>
+              <a:t>may</a:t>
+            </a:r>
+            <a:r>
+              <a:rPr lang="en-US" dirty="0">
+                <a:gradFill>
+                  <a:gsLst>
+                    <a:gs pos="2917">
+                      <a:schemeClr val="tx1"/>
+                    </a:gs>
+                    <a:gs pos="30000">
+                      <a:schemeClr val="tx1"/>
+                    </a:gs>
+                  </a:gsLst>
+                  <a:lin ang="5400000" scaled="0"/>
+                </a:gradFill>
+              </a:rPr>
+              <a:t> need to changed.</a:t>
             </a:r>
           </a:p>
           <a:p>
@@ -32548,6 +32719,78 @@
                 <a:lin ang="5400000" scaled="0"/>
               </a:gradFill>
             </a:endParaRPr>
+          </a:p>
+          <a:p>
+            <a:pPr marL="342900" indent="-342900">
+              <a:lnSpc>
+                <a:spcPct val="90000"/>
+              </a:lnSpc>
+              <a:spcAft>
+                <a:spcPts val="600"/>
+              </a:spcAft>
+              <a:buFont typeface="Arial" panose="020B0604020202020204" pitchFamily="34" charset="0"/>
+              <a:buChar char="•"/>
+            </a:pPr>
+            <a:r>
+              <a:rPr lang="en-US" sz="1600" dirty="0">
+                <a:gradFill>
+                  <a:gsLst>
+                    <a:gs pos="2917">
+                      <a:schemeClr val="tx1"/>
+                    </a:gs>
+                    <a:gs pos="30000">
+                      <a:schemeClr val="tx1"/>
+                    </a:gs>
+                  </a:gsLst>
+                  <a:lin ang="5400000" scaled="0"/>
+                </a:gradFill>
+              </a:rPr>
+              <a:t>Database – Default DB for Teradata.  </a:t>
+            </a:r>
+            <a:r>
+              <a:rPr lang="en-US" sz="1600" b="1" dirty="0">
+                <a:gradFill>
+                  <a:gsLst>
+                    <a:gs pos="2917">
+                      <a:schemeClr val="tx1"/>
+                    </a:gs>
+                    <a:gs pos="30000">
+                      <a:schemeClr val="tx1"/>
+                    </a:gs>
+                  </a:gsLst>
+                  <a:lin ang="5400000" scaled="0"/>
+                </a:gradFill>
+              </a:rPr>
+              <a:t>This should not be changed.</a:t>
+            </a:r>
+          </a:p>
+          <a:p>
+            <a:pPr marL="342900" indent="-342900">
+              <a:lnSpc>
+                <a:spcPct val="90000"/>
+              </a:lnSpc>
+              <a:spcAft>
+                <a:spcPts val="600"/>
+              </a:spcAft>
+              <a:buFont typeface="Arial" panose="020B0604020202020204" pitchFamily="34" charset="0"/>
+              <a:buChar char="•"/>
+            </a:pPr>
+            <a:r>
+              <a:rPr lang="en-US" sz="1600" dirty="0">
+                <a:gradFill>
+                  <a:gsLst>
+                    <a:gs pos="2917">
+                      <a:schemeClr val="tx1"/>
+                    </a:gs>
+                    <a:gs pos="30000">
+                      <a:schemeClr val="tx1"/>
+                    </a:gs>
+                  </a:gsLst>
+                  <a:lin ang="5400000" scaled="0"/>
+                </a:gradFill>
+              </a:rPr>
+              <a:t>Port – Port to use to connect to the Netezza.  </a:t>
+            </a:r>
           </a:p>
           <a:p>
             <a:pPr marL="342900" indent="-342900">
@@ -32579,7 +32822,7 @@
     </p:spTree>
     <p:extLst>
       <p:ext uri="{BB962C8B-B14F-4D97-AF65-F5344CB8AC3E}">
-        <p14:creationId xmlns:p14="http://schemas.microsoft.com/office/powerpoint/2010/main" val="2405980199"/>
+        <p14:creationId xmlns:p14="http://schemas.microsoft.com/office/powerpoint/2010/main" val="843727165"/>
       </p:ext>
     </p:extLst>
   </p:cSld>
@@ -32660,6 +32903,522 @@
         </p:nvSpPr>
         <p:spPr>
           <a:xfrm>
+            <a:off x="2439768" y="2984291"/>
+            <a:ext cx="7556938" cy="2862322"/>
+          </a:xfrm>
+          <a:prstGeom prst="rect">
+            <a:avLst/>
+          </a:prstGeom>
+          <a:ln>
+            <a:solidFill>
+              <a:srgbClr val="008272"/>
+            </a:solidFill>
+          </a:ln>
+        </p:spPr>
+        <p:txBody>
+          <a:bodyPr wrap="square">
+            <a:spAutoFit/>
+          </a:bodyPr>
+          <a:lstStyle/>
+          <a:p>
+            <a:pPr>
+              <a:tabLst>
+                <a:tab pos="461963" algn="l"/>
+                <a:tab pos="914400" algn="l"/>
+              </a:tabLst>
+            </a:pPr>
+            <a:r>
+              <a:rPr lang="en-US" sz="1200" dirty="0"/>
+              <a:t>"</a:t>
+            </a:r>
+            <a:r>
+              <a:rPr lang="en-US" sz="1200" dirty="0" err="1"/>
+              <a:t>VersionQuery</a:t>
+            </a:r>
+            <a:r>
+              <a:rPr lang="en-US" sz="1200" dirty="0"/>
+              <a:t>":</a:t>
+            </a:r>
+          </a:p>
+          <a:p>
+            <a:pPr>
+              <a:tabLst>
+                <a:tab pos="461963" algn="l"/>
+                <a:tab pos="914400" algn="l"/>
+              </a:tabLst>
+            </a:pPr>
+            <a:r>
+              <a:rPr lang="en-US" sz="1200" dirty="0"/>
+              <a:t>[</a:t>
+            </a:r>
+          </a:p>
+          <a:p>
+            <a:pPr>
+              <a:tabLst>
+                <a:tab pos="461963" algn="l"/>
+                <a:tab pos="914400" algn="l"/>
+              </a:tabLst>
+            </a:pPr>
+            <a:r>
+              <a:rPr lang="en-US" sz="1200" dirty="0"/>
+              <a:t>	{</a:t>
+            </a:r>
+          </a:p>
+          <a:p>
+            <a:pPr>
+              <a:tabLst>
+                <a:tab pos="461963" algn="l"/>
+                <a:tab pos="914400" algn="l"/>
+              </a:tabLst>
+            </a:pPr>
+            <a:r>
+              <a:rPr lang="en-US" sz="1200" dirty="0"/>
+              <a:t>		"</a:t>
+            </a:r>
+            <a:r>
+              <a:rPr lang="en-US" sz="1200" dirty="0" err="1"/>
+              <a:t>System":"Netezza</a:t>
+            </a:r>
+            <a:r>
+              <a:rPr lang="en-US" sz="1200" dirty="0"/>
+              <a:t>",</a:t>
+            </a:r>
+          </a:p>
+          <a:p>
+            <a:pPr>
+              <a:tabLst>
+                <a:tab pos="461963" algn="l"/>
+                <a:tab pos="914400" algn="l"/>
+              </a:tabLst>
+            </a:pPr>
+            <a:r>
+              <a:rPr lang="en-US" sz="1200" dirty="0"/>
+              <a:t>		"</a:t>
+            </a:r>
+            <a:r>
+              <a:rPr lang="en-US" sz="1200" dirty="0" err="1"/>
+              <a:t>Query":"select</a:t>
+            </a:r>
+            <a:r>
+              <a:rPr lang="en-US" sz="1200" dirty="0"/>
+              <a:t> </a:t>
+            </a:r>
+            <a:r>
+              <a:rPr lang="en-US" sz="1200" dirty="0" err="1"/>
+              <a:t>system_software_version</a:t>
+            </a:r>
+            <a:r>
+              <a:rPr lang="en-US" sz="1200" dirty="0"/>
+              <a:t> Version from _</a:t>
+            </a:r>
+            <a:r>
+              <a:rPr lang="en-US" sz="1200" dirty="0" err="1"/>
+              <a:t>v_system_info</a:t>
+            </a:r>
+            <a:r>
+              <a:rPr lang="en-US" sz="1200" dirty="0"/>
+              <a:t>"</a:t>
+            </a:r>
+          </a:p>
+          <a:p>
+            <a:pPr>
+              <a:tabLst>
+                <a:tab pos="461963" algn="l"/>
+                <a:tab pos="914400" algn="l"/>
+              </a:tabLst>
+            </a:pPr>
+            <a:r>
+              <a:rPr lang="en-US" sz="1200" dirty="0"/>
+              <a:t>	},</a:t>
+            </a:r>
+          </a:p>
+          <a:p>
+            <a:pPr>
+              <a:tabLst>
+                <a:tab pos="461963" algn="l"/>
+                <a:tab pos="914400" algn="l"/>
+              </a:tabLst>
+            </a:pPr>
+            <a:r>
+              <a:rPr lang="en-US" sz="1200" dirty="0"/>
+              <a:t>	{</a:t>
+            </a:r>
+          </a:p>
+          <a:p>
+            <a:pPr>
+              <a:tabLst>
+                <a:tab pos="461963" algn="l"/>
+                <a:tab pos="914400" algn="l"/>
+              </a:tabLst>
+            </a:pPr>
+            <a:r>
+              <a:rPr lang="en-US" sz="1200" dirty="0"/>
+              <a:t>		"</a:t>
+            </a:r>
+            <a:r>
+              <a:rPr lang="en-US" sz="1200" dirty="0" err="1"/>
+              <a:t>System":"APS</a:t>
+            </a:r>
+            <a:r>
+              <a:rPr lang="en-US" sz="1200" dirty="0"/>
+              <a:t>",</a:t>
+            </a:r>
+          </a:p>
+          <a:p>
+            <a:pPr>
+              <a:tabLst>
+                <a:tab pos="461963" algn="l"/>
+                <a:tab pos="914400" algn="l"/>
+              </a:tabLst>
+            </a:pPr>
+            <a:r>
+              <a:rPr lang="en-US" sz="1200" dirty="0"/>
+              <a:t>		"</a:t>
+            </a:r>
+            <a:r>
+              <a:rPr lang="en-US" sz="1200" dirty="0" err="1"/>
+              <a:t>Query":"select</a:t>
+            </a:r>
+            <a:r>
+              <a:rPr lang="en-US" sz="1200" dirty="0"/>
+              <a:t> @@version as Version"</a:t>
+            </a:r>
+          </a:p>
+          <a:p>
+            <a:pPr>
+              <a:tabLst>
+                <a:tab pos="461963" algn="l"/>
+                <a:tab pos="914400" algn="l"/>
+              </a:tabLst>
+            </a:pPr>
+            <a:r>
+              <a:rPr lang="en-US" sz="1200" dirty="0"/>
+              <a:t>	},</a:t>
+            </a:r>
+          </a:p>
+          <a:p>
+            <a:pPr>
+              <a:tabLst>
+                <a:tab pos="461963" algn="l"/>
+                <a:tab pos="914400" algn="l"/>
+              </a:tabLst>
+            </a:pPr>
+            <a:r>
+              <a:rPr lang="en-US" sz="1200" dirty="0"/>
+              <a:t>	{</a:t>
+            </a:r>
+          </a:p>
+          <a:p>
+            <a:pPr>
+              <a:tabLst>
+                <a:tab pos="461963" algn="l"/>
+                <a:tab pos="914400" algn="l"/>
+              </a:tabLst>
+            </a:pPr>
+            <a:r>
+              <a:rPr lang="en-US" sz="1200" dirty="0"/>
+              <a:t>		"</a:t>
+            </a:r>
+            <a:r>
+              <a:rPr lang="en-US" sz="1200" dirty="0" err="1"/>
+              <a:t>System":"AZUREDW</a:t>
+            </a:r>
+            <a:r>
+              <a:rPr lang="en-US" sz="1200" dirty="0"/>
+              <a:t>",</a:t>
+            </a:r>
+          </a:p>
+          <a:p>
+            <a:pPr>
+              <a:tabLst>
+                <a:tab pos="461963" algn="l"/>
+                <a:tab pos="914400" algn="l"/>
+              </a:tabLst>
+            </a:pPr>
+            <a:r>
+              <a:rPr lang="en-US" sz="1200" dirty="0"/>
+              <a:t>		"</a:t>
+            </a:r>
+            <a:r>
+              <a:rPr lang="en-US" sz="1200" dirty="0" err="1"/>
+              <a:t>Query":"select</a:t>
+            </a:r>
+            <a:r>
+              <a:rPr lang="en-US" sz="1200" dirty="0"/>
+              <a:t> @@version as Version"</a:t>
+            </a:r>
+          </a:p>
+          <a:p>
+            <a:pPr>
+              <a:tabLst>
+                <a:tab pos="461963" algn="l"/>
+                <a:tab pos="914400" algn="l"/>
+              </a:tabLst>
+            </a:pPr>
+            <a:r>
+              <a:rPr lang="en-US" sz="1200" dirty="0"/>
+              <a:t>	}</a:t>
+            </a:r>
+          </a:p>
+          <a:p>
+            <a:pPr>
+              <a:tabLst>
+                <a:tab pos="461963" algn="l"/>
+                <a:tab pos="914400" algn="l"/>
+              </a:tabLst>
+            </a:pPr>
+            <a:r>
+              <a:rPr lang="en-US" sz="1200" dirty="0"/>
+              <a:t>],</a:t>
+            </a:r>
+          </a:p>
+        </p:txBody>
+      </p:sp>
+      <p:sp>
+        <p:nvSpPr>
+          <p:cNvPr id="5" name="TextBox 4">
+            <a:extLst>
+              <a:ext uri="{FF2B5EF4-FFF2-40B4-BE49-F238E27FC236}">
+                <a16:creationId xmlns:a16="http://schemas.microsoft.com/office/drawing/2014/main" id="{5DE44563-C5C8-477E-AA60-DE46226ACF42}"/>
+              </a:ext>
+            </a:extLst>
+          </p:cNvPr>
+          <p:cNvSpPr txBox="1"/>
+          <p:nvPr/>
+        </p:nvSpPr>
+        <p:spPr>
+          <a:xfrm>
+            <a:off x="157655" y="1147912"/>
+            <a:ext cx="11896340" cy="1883593"/>
+          </a:xfrm>
+          <a:prstGeom prst="rect">
+            <a:avLst/>
+          </a:prstGeom>
+          <a:noFill/>
+        </p:spPr>
+        <p:txBody>
+          <a:bodyPr wrap="square" lIns="182880" tIns="146304" rIns="182880" bIns="146304" rtlCol="0">
+            <a:spAutoFit/>
+          </a:bodyPr>
+          <a:lstStyle/>
+          <a:p>
+            <a:pPr>
+              <a:lnSpc>
+                <a:spcPct val="90000"/>
+              </a:lnSpc>
+              <a:spcAft>
+                <a:spcPts val="600"/>
+              </a:spcAft>
+            </a:pPr>
+            <a:r>
+              <a:rPr lang="en-US" sz="3200" b="1" dirty="0">
+                <a:gradFill>
+                  <a:gsLst>
+                    <a:gs pos="2917">
+                      <a:schemeClr val="tx1"/>
+                    </a:gs>
+                    <a:gs pos="30000">
+                      <a:schemeClr val="tx1"/>
+                    </a:gs>
+                  </a:gsLst>
+                  <a:lin ang="5400000" scaled="0"/>
+                </a:gradFill>
+              </a:rPr>
+              <a:t>Version Query Configuration: </a:t>
+            </a:r>
+          </a:p>
+          <a:p>
+            <a:pPr>
+              <a:lnSpc>
+                <a:spcPct val="90000"/>
+              </a:lnSpc>
+              <a:spcAft>
+                <a:spcPts val="600"/>
+              </a:spcAft>
+            </a:pPr>
+            <a:r>
+              <a:rPr lang="en-US" dirty="0">
+                <a:gradFill>
+                  <a:gsLst>
+                    <a:gs pos="2917">
+                      <a:schemeClr val="tx1"/>
+                    </a:gs>
+                    <a:gs pos="30000">
+                      <a:schemeClr val="tx1"/>
+                    </a:gs>
+                  </a:gsLst>
+                  <a:lin ang="5400000" scaled="0"/>
+                </a:gradFill>
+              </a:rPr>
+              <a:t>The</a:t>
+            </a:r>
+            <a:r>
+              <a:rPr lang="en-US" sz="3200" b="1" dirty="0">
+                <a:gradFill>
+                  <a:gsLst>
+                    <a:gs pos="2917">
+                      <a:schemeClr val="tx1"/>
+                    </a:gs>
+                    <a:gs pos="30000">
+                      <a:schemeClr val="tx1"/>
+                    </a:gs>
+                  </a:gsLst>
+                  <a:lin ang="5400000" scaled="0"/>
+                </a:gradFill>
+              </a:rPr>
+              <a:t> </a:t>
+            </a:r>
+            <a:r>
+              <a:rPr lang="en-US" dirty="0">
+                <a:gradFill>
+                  <a:gsLst>
+                    <a:gs pos="2917">
+                      <a:schemeClr val="tx1"/>
+                    </a:gs>
+                    <a:gs pos="30000">
+                      <a:schemeClr val="tx1"/>
+                    </a:gs>
+                  </a:gsLst>
+                  <a:lin ang="5400000" scaled="0"/>
+                </a:gradFill>
+              </a:rPr>
+              <a:t>query needed to return the version of the source system for each support system.</a:t>
+            </a:r>
+          </a:p>
+          <a:p>
+            <a:pPr>
+              <a:lnSpc>
+                <a:spcPct val="90000"/>
+              </a:lnSpc>
+              <a:spcAft>
+                <a:spcPts val="600"/>
+              </a:spcAft>
+            </a:pPr>
+            <a:endParaRPr lang="en-US" dirty="0">
+              <a:gradFill>
+                <a:gsLst>
+                  <a:gs pos="2917">
+                    <a:schemeClr val="tx1"/>
+                  </a:gs>
+                  <a:gs pos="30000">
+                    <a:schemeClr val="tx1"/>
+                  </a:gs>
+                </a:gsLst>
+                <a:lin ang="5400000" scaled="0"/>
+              </a:gradFill>
+            </a:endParaRPr>
+          </a:p>
+          <a:p>
+            <a:pPr marL="342900" indent="-342900">
+              <a:lnSpc>
+                <a:spcPct val="90000"/>
+              </a:lnSpc>
+              <a:spcAft>
+                <a:spcPts val="600"/>
+              </a:spcAft>
+              <a:buFont typeface="Arial" panose="020B0604020202020204" pitchFamily="34" charset="0"/>
+              <a:buChar char="•"/>
+            </a:pPr>
+            <a:endParaRPr lang="en-US" sz="1600" dirty="0">
+              <a:gradFill>
+                <a:gsLst>
+                  <a:gs pos="2917">
+                    <a:schemeClr val="tx1"/>
+                  </a:gs>
+                  <a:gs pos="30000">
+                    <a:schemeClr val="tx1"/>
+                  </a:gs>
+                </a:gsLst>
+                <a:lin ang="5400000" scaled="0"/>
+              </a:gradFill>
+            </a:endParaRPr>
+          </a:p>
+        </p:txBody>
+      </p:sp>
+    </p:spTree>
+    <p:extLst>
+      <p:ext uri="{BB962C8B-B14F-4D97-AF65-F5344CB8AC3E}">
+        <p14:creationId xmlns:p14="http://schemas.microsoft.com/office/powerpoint/2010/main" val="2405980199"/>
+      </p:ext>
+    </p:extLst>
+  </p:cSld>
+  <p:clrMapOvr>
+    <a:masterClrMapping/>
+  </p:clrMapOvr>
+  <mc:AlternateContent xmlns:mc="http://schemas.openxmlformats.org/markup-compatibility/2006" xmlns:p14="http://schemas.microsoft.com/office/powerpoint/2010/main">
+    <mc:Choice Requires="p14">
+      <p:transition spd="med" p14:dur="700">
+        <p:fade/>
+      </p:transition>
+    </mc:Choice>
+    <mc:Fallback xmlns="">
+      <p:transition spd="med">
+        <p:fade/>
+      </p:transition>
+    </mc:Fallback>
+  </mc:AlternateContent>
+</p:sld>
+</file>
+
+<file path=ppt/slides/slide17.xml><?xml version="1.0" encoding="utf-8"?>
+<p:sld xmlns:a="http://schemas.openxmlformats.org/drawingml/2006/main" xmlns:r="http://schemas.openxmlformats.org/officeDocument/2006/relationships" xmlns:p="http://schemas.openxmlformats.org/presentationml/2006/main">
+  <p:cSld>
+    <p:spTree>
+      <p:nvGrpSpPr>
+        <p:cNvPr id="1" name=""/>
+        <p:cNvGrpSpPr/>
+        <p:nvPr/>
+      </p:nvGrpSpPr>
+      <p:grpSpPr>
+        <a:xfrm>
+          <a:off x="0" y="0"/>
+          <a:ext cx="0" cy="0"/>
+          <a:chOff x="0" y="0"/>
+          <a:chExt cx="0" cy="0"/>
+        </a:xfrm>
+      </p:grpSpPr>
+      <p:sp>
+        <p:nvSpPr>
+          <p:cNvPr id="2" name="Text Placeholder 1">
+            <a:extLst>
+              <a:ext uri="{FF2B5EF4-FFF2-40B4-BE49-F238E27FC236}">
+                <a16:creationId xmlns:a16="http://schemas.microsoft.com/office/drawing/2014/main" id="{D9F337F9-3070-4108-A47D-916034F6651B}"/>
+              </a:ext>
+            </a:extLst>
+          </p:cNvPr>
+          <p:cNvSpPr>
+            <a:spLocks noGrp="1"/>
+          </p:cNvSpPr>
+          <p:nvPr>
+            <p:ph type="body" sz="quarter" idx="10"/>
+          </p:nvPr>
+        </p:nvSpPr>
+        <p:spPr/>
+        <p:txBody>
+          <a:bodyPr/>
+          <a:lstStyle/>
+          <a:p>
+            <a:r>
+              <a:rPr lang="en-US" dirty="0"/>
+              <a:t>Assessment Tool – Configuration - JSON</a:t>
+            </a:r>
+          </a:p>
+        </p:txBody>
+      </p:sp>
+      <p:sp>
+        <p:nvSpPr>
+          <p:cNvPr id="4" name="Rectangle 3">
+            <a:extLst>
+              <a:ext uri="{FF2B5EF4-FFF2-40B4-BE49-F238E27FC236}">
+                <a16:creationId xmlns:a16="http://schemas.microsoft.com/office/drawing/2014/main" id="{32F62CCD-C4C5-48E1-B39F-12D24D71985C}"/>
+              </a:ext>
+            </a:extLst>
+          </p:cNvPr>
+          <p:cNvSpPr/>
+          <p:nvPr/>
+        </p:nvSpPr>
+        <p:spPr>
+          <a:xfrm>
             <a:off x="1294825" y="3962568"/>
             <a:ext cx="9846823" cy="2862322"/>
           </a:xfrm>
@@ -33175,7 +33934,7 @@
 </p:sld>
 </file>
 
-<file path=ppt/slides/slide17.xml><?xml version="1.0" encoding="utf-8"?>
+<file path=ppt/slides/slide18.xml><?xml version="1.0" encoding="utf-8"?>
 <p:sld xmlns:a="http://schemas.openxmlformats.org/drawingml/2006/main" xmlns:r="http://schemas.openxmlformats.org/officeDocument/2006/relationships" xmlns:p="http://schemas.openxmlformats.org/presentationml/2006/main">
   <p:cSld>
     <p:spTree>
@@ -36831,36 +37590,6 @@
           </a:prstGeom>
         </p:spPr>
       </p:pic>
-      <p:pic>
-        <p:nvPicPr>
-          <p:cNvPr id="25" name="Picture 24" descr="A close up of a logo&#10;&#10;Description automatically generated">
-            <a:extLst>
-              <a:ext uri="{FF2B5EF4-FFF2-40B4-BE49-F238E27FC236}">
-                <a16:creationId xmlns:a16="http://schemas.microsoft.com/office/drawing/2014/main" id="{A92814D2-59A7-4509-9FA1-F65FF5646244}"/>
-              </a:ext>
-            </a:extLst>
-          </p:cNvPr>
-          <p:cNvPicPr>
-            <a:picLocks noChangeAspect="1"/>
-          </p:cNvPicPr>
-          <p:nvPr/>
-        </p:nvPicPr>
-        <p:blipFill>
-          <a:blip r:embed="rId7"/>
-          <a:stretch>
-            <a:fillRect/>
-          </a:stretch>
-        </p:blipFill>
-        <p:spPr>
-          <a:xfrm>
-            <a:off x="2463017" y="2506533"/>
-            <a:ext cx="778748" cy="778748"/>
-          </a:xfrm>
-          <a:prstGeom prst="rect">
-            <a:avLst/>
-          </a:prstGeom>
-        </p:spPr>
-      </p:pic>
       <p:sp>
         <p:nvSpPr>
           <p:cNvPr id="3" name="TextBox 2">
@@ -36898,13 +37627,18 @@
               </a:spcAft>
             </a:pPr>
             <a:r>
-              <a:rPr lang="en-US" sz="2400" b="1" dirty="0">
+              <a:rPr lang="en-US" sz="2400" b="1">
                 <a:solidFill>
                   <a:srgbClr val="FFC000"/>
                 </a:solidFill>
               </a:rPr>
               <a:t>TERADATA</a:t>
             </a:r>
+            <a:endParaRPr lang="en-US" sz="2400" b="1" dirty="0">
+              <a:solidFill>
+                <a:srgbClr val="FFC000"/>
+              </a:solidFill>
+            </a:endParaRPr>
           </a:p>
         </p:txBody>
       </p:sp>
@@ -36951,6 +37685,53 @@
                 </a:solidFill>
               </a:rPr>
               <a:t>Netezza</a:t>
+            </a:r>
+          </a:p>
+        </p:txBody>
+      </p:sp>
+      <p:sp>
+        <p:nvSpPr>
+          <p:cNvPr id="21" name="TextBox 20">
+            <a:extLst>
+              <a:ext uri="{FF2B5EF4-FFF2-40B4-BE49-F238E27FC236}">
+                <a16:creationId xmlns:a16="http://schemas.microsoft.com/office/drawing/2014/main" id="{48834CDB-BD23-4D5D-A629-83DBBC17D3D2}"/>
+              </a:ext>
+            </a:extLst>
+          </p:cNvPr>
+          <p:cNvSpPr txBox="1"/>
+          <p:nvPr/>
+        </p:nvSpPr>
+        <p:spPr>
+          <a:xfrm>
+            <a:off x="1717776" y="2372937"/>
+            <a:ext cx="2002844" cy="627864"/>
+          </a:xfrm>
+          <a:prstGeom prst="rect">
+            <a:avLst/>
+          </a:prstGeom>
+          <a:noFill/>
+        </p:spPr>
+        <p:txBody>
+          <a:bodyPr wrap="square" lIns="182880" tIns="146304" rIns="182880" bIns="146304" rtlCol="0">
+            <a:spAutoFit/>
+          </a:bodyPr>
+          <a:lstStyle/>
+          <a:p>
+            <a:pPr>
+              <a:lnSpc>
+                <a:spcPct val="90000"/>
+              </a:lnSpc>
+              <a:spcAft>
+                <a:spcPts val="600"/>
+              </a:spcAft>
+            </a:pPr>
+            <a:r>
+              <a:rPr lang="en-US" sz="2400" b="1" dirty="0">
+                <a:solidFill>
+                  <a:srgbClr val="FF0000"/>
+                </a:solidFill>
+              </a:rPr>
+              <a:t>APS\PDW</a:t>
             </a:r>
           </a:p>
         </p:txBody>
@@ -41971,36 +42752,6 @@
           </a:prstGeom>
         </p:spPr>
       </p:pic>
-      <p:pic>
-        <p:nvPicPr>
-          <p:cNvPr id="30" name="Picture 29" descr="A close up of a logo&#10;&#10;Description automatically generated">
-            <a:extLst>
-              <a:ext uri="{FF2B5EF4-FFF2-40B4-BE49-F238E27FC236}">
-                <a16:creationId xmlns:a16="http://schemas.microsoft.com/office/drawing/2014/main" id="{9CF23C9F-D8E1-4794-933D-F0A4E3C51B06}"/>
-              </a:ext>
-            </a:extLst>
-          </p:cNvPr>
-          <p:cNvPicPr>
-            <a:picLocks noChangeAspect="1"/>
-          </p:cNvPicPr>
-          <p:nvPr/>
-        </p:nvPicPr>
-        <p:blipFill>
-          <a:blip r:embed="rId8"/>
-          <a:stretch>
-            <a:fillRect/>
-          </a:stretch>
-        </p:blipFill>
-        <p:spPr>
-          <a:xfrm>
-            <a:off x="1149117" y="3745553"/>
-            <a:ext cx="778748" cy="778748"/>
-          </a:xfrm>
-          <a:prstGeom prst="rect">
-            <a:avLst/>
-          </a:prstGeom>
-        </p:spPr>
-      </p:pic>
       <p:sp>
         <p:nvSpPr>
           <p:cNvPr id="31" name="TextBox 30">
@@ -42091,6 +42842,53 @@
                 </a:solidFill>
               </a:rPr>
               <a:t>Netezza</a:t>
+            </a:r>
+          </a:p>
+        </p:txBody>
+      </p:sp>
+      <p:sp>
+        <p:nvSpPr>
+          <p:cNvPr id="29" name="TextBox 28">
+            <a:extLst>
+              <a:ext uri="{FF2B5EF4-FFF2-40B4-BE49-F238E27FC236}">
+                <a16:creationId xmlns:a16="http://schemas.microsoft.com/office/drawing/2014/main" id="{A263207F-B813-4E83-870C-D37CA218B314}"/>
+              </a:ext>
+            </a:extLst>
+          </p:cNvPr>
+          <p:cNvSpPr txBox="1"/>
+          <p:nvPr/>
+        </p:nvSpPr>
+        <p:spPr>
+          <a:xfrm>
+            <a:off x="585110" y="3578271"/>
+            <a:ext cx="2002844" cy="627864"/>
+          </a:xfrm>
+          <a:prstGeom prst="rect">
+            <a:avLst/>
+          </a:prstGeom>
+          <a:noFill/>
+        </p:spPr>
+        <p:txBody>
+          <a:bodyPr wrap="square" lIns="182880" tIns="146304" rIns="182880" bIns="146304" rtlCol="0">
+            <a:spAutoFit/>
+          </a:bodyPr>
+          <a:lstStyle/>
+          <a:p>
+            <a:pPr>
+              <a:lnSpc>
+                <a:spcPct val="90000"/>
+              </a:lnSpc>
+              <a:spcAft>
+                <a:spcPts val="600"/>
+              </a:spcAft>
+            </a:pPr>
+            <a:r>
+              <a:rPr lang="en-US" sz="2400" b="1" dirty="0">
+                <a:solidFill>
+                  <a:srgbClr val="FF0000"/>
+                </a:solidFill>
+              </a:rPr>
+              <a:t>APS\PDW</a:t>
             </a:r>
           </a:p>
         </p:txBody>
@@ -46001,19 +46799,12 @@
 </file>
 
 <file path=customXml/item1.xml><?xml version="1.0" encoding="utf-8"?>
-<p:properties xmlns:p="http://schemas.microsoft.com/office/2006/metadata/properties" xmlns:xsi="http://www.w3.org/2001/XMLSchema-instance" xmlns:pc="http://schemas.microsoft.com/office/infopath/2007/PartnerControls">
-  <documentManagement>
-    <LastSharedByUser xmlns="738c2dd8-7dd6-440d-aa04-76a8929a2564">v-aniwal@microsoft.com</LastSharedByUser>
-    <SharedWithUsers xmlns="738c2dd8-7dd6-440d-aa04-76a8929a2564">
-      <UserInfo>
-        <DisplayName>Winnie Crockett (Brook Street)</DisplayName>
-        <AccountId>24292</AccountId>
-        <AccountType/>
-      </UserInfo>
-    </SharedWithUsers>
-    <LastSharedByTime xmlns="738c2dd8-7dd6-440d-aa04-76a8929a2564">2018-04-19T19:58:02+00:00</LastSharedByTime>
-  </documentManagement>
-</p:properties>
+<?mso-contentType ?>
+<FormTemplates xmlns="http://schemas.microsoft.com/sharepoint/v3/contenttype/forms">
+  <Display>DocumentLibraryForm</Display>
+  <Edit>DocumentLibraryForm</Edit>
+  <New>DocumentLibraryForm</New>
+</FormTemplates>
 </file>
 
 <file path=customXml/item2.xml><?xml version="1.0" encoding="utf-8"?>
@@ -46194,27 +46985,25 @@
 </file>
 
 <file path=customXml/item3.xml><?xml version="1.0" encoding="utf-8"?>
-<?mso-contentType ?>
-<FormTemplates xmlns="http://schemas.microsoft.com/sharepoint/v3/contenttype/forms">
-  <Display>DocumentLibraryForm</Display>
-  <Edit>DocumentLibraryForm</Edit>
-  <New>DocumentLibraryForm</New>
-</FormTemplates>
+<p:properties xmlns:p="http://schemas.microsoft.com/office/2006/metadata/properties" xmlns:xsi="http://www.w3.org/2001/XMLSchema-instance" xmlns:pc="http://schemas.microsoft.com/office/infopath/2007/PartnerControls">
+  <documentManagement>
+    <LastSharedByUser xmlns="738c2dd8-7dd6-440d-aa04-76a8929a2564">v-aniwal@microsoft.com</LastSharedByUser>
+    <SharedWithUsers xmlns="738c2dd8-7dd6-440d-aa04-76a8929a2564">
+      <UserInfo>
+        <DisplayName>Winnie Crockett (Brook Street)</DisplayName>
+        <AccountId>24292</AccountId>
+        <AccountType/>
+      </UserInfo>
+    </SharedWithUsers>
+    <LastSharedByTime xmlns="738c2dd8-7dd6-440d-aa04-76a8929a2564">2018-04-19T19:58:02+00:00</LastSharedByTime>
+  </documentManagement>
+</p:properties>
 </file>
 
 <file path=customXml/itemProps1.xml><?xml version="1.0" encoding="utf-8"?>
-<ds:datastoreItem xmlns:ds="http://schemas.openxmlformats.org/officeDocument/2006/customXml" ds:itemID="{A5FE19FB-38FB-4FC7-990B-E59390BC385E}">
+<ds:datastoreItem xmlns:ds="http://schemas.openxmlformats.org/officeDocument/2006/customXml" ds:itemID="{43E27C34-01A3-4E4B-BAB7-97410D48DB69}">
   <ds:schemaRefs>
-    <ds:schemaRef ds:uri="http://schemas.microsoft.com/office/2006/documentManagement/types"/>
-    <ds:schemaRef ds:uri="http://purl.org/dc/terms/"/>
-    <ds:schemaRef ds:uri="http://schemas.openxmlformats.org/package/2006/metadata/core-properties"/>
-    <ds:schemaRef ds:uri="b018db0b-322c-4925-9fdb-2f34949f0610"/>
-    <ds:schemaRef ds:uri="http://purl.org/dc/dcmitype/"/>
-    <ds:schemaRef ds:uri="http://schemas.microsoft.com/office/infopath/2007/PartnerControls"/>
-    <ds:schemaRef ds:uri="http://purl.org/dc/elements/1.1/"/>
-    <ds:schemaRef ds:uri="http://schemas.microsoft.com/office/2006/metadata/properties"/>
-    <ds:schemaRef ds:uri="738c2dd8-7dd6-440d-aa04-76a8929a2564"/>
-    <ds:schemaRef ds:uri="http://www.w3.org/XML/1998/namespace"/>
+    <ds:schemaRef ds:uri="http://schemas.microsoft.com/sharepoint/v3/contenttype/forms"/>
   </ds:schemaRefs>
 </ds:datastoreItem>
 </file>
@@ -46239,9 +47028,18 @@
 </file>
 
 <file path=customXml/itemProps3.xml><?xml version="1.0" encoding="utf-8"?>
-<ds:datastoreItem xmlns:ds="http://schemas.openxmlformats.org/officeDocument/2006/customXml" ds:itemID="{43E27C34-01A3-4E4B-BAB7-97410D48DB69}">
+<ds:datastoreItem xmlns:ds="http://schemas.openxmlformats.org/officeDocument/2006/customXml" ds:itemID="{A5FE19FB-38FB-4FC7-990B-E59390BC385E}">
   <ds:schemaRefs>
-    <ds:schemaRef ds:uri="http://schemas.microsoft.com/sharepoint/v3/contenttype/forms"/>
+    <ds:schemaRef ds:uri="http://schemas.microsoft.com/office/2006/documentManagement/types"/>
+    <ds:schemaRef ds:uri="http://purl.org/dc/terms/"/>
+    <ds:schemaRef ds:uri="http://schemas.openxmlformats.org/package/2006/metadata/core-properties"/>
+    <ds:schemaRef ds:uri="b018db0b-322c-4925-9fdb-2f34949f0610"/>
+    <ds:schemaRef ds:uri="http://purl.org/dc/dcmitype/"/>
+    <ds:schemaRef ds:uri="http://schemas.microsoft.com/office/infopath/2007/PartnerControls"/>
+    <ds:schemaRef ds:uri="http://purl.org/dc/elements/1.1/"/>
+    <ds:schemaRef ds:uri="http://schemas.microsoft.com/office/2006/metadata/properties"/>
+    <ds:schemaRef ds:uri="738c2dd8-7dd6-440d-aa04-76a8929a2564"/>
+    <ds:schemaRef ds:uri="http://www.w3.org/XML/1998/namespace"/>
   </ds:schemaRefs>
 </ds:datastoreItem>
 </file>
</xml_diff>